<commit_message>
renewal readme links, along with tutorials pdf and pptx
</commit_message>
<xml_diff>
--- a/tutorials/non-developers/tutorials-non-developers-indonesia.pptx
+++ b/tutorials/non-developers/tutorials-non-developers-indonesia.pptx
@@ -5114,7 +5114,7 @@
                   </a:outerShdw>
                 </a:effectLst>
               </a:rPr>
-              <a:t>.norm</a:t>
+              <a:t>.post</a:t>
             </a:r>
             <a:endParaRPr lang="en-US" sz="2400" b="1" dirty="0">
               <a:ln w="17780" cmpd="sng">
@@ -6348,7 +6348,7 @@
           <a:p>
             <a:r>
               <a:rPr lang="en-US" b="1" dirty="0" smtClean="0"/>
-              <a:t>*.norm File</a:t>
+              <a:t>*.post File</a:t>
             </a:r>
             <a:r>
               <a:rPr lang="en-US" dirty="0" smtClean="0"/>
@@ -6798,7 +6798,7 @@
           <a:p>
             <a:r>
               <a:rPr lang="en-US" b="1" dirty="0" smtClean="0"/>
-              <a:t>*.norm Format</a:t>
+              <a:t>*.post Format</a:t>
             </a:r>
             <a:r>
               <a:rPr lang="en-US" dirty="0" smtClean="0"/>
@@ -15344,7 +15344,7 @@
             </a:pPr>
             <a:r>
               <a:rPr lang="en-US" b="1" dirty="0" smtClean="0"/>
-              <a:t>*.norm</a:t>
+              <a:t>*.post</a:t>
             </a:r>
           </a:p>
           <a:p>
@@ -15866,7 +15866,15 @@
                   <a:srgbClr val="FF0000"/>
                 </a:solidFill>
               </a:rPr>
-              <a:t>–path=C:\mysocnet –account=gumuruh@gmail,kunci1234,facebook </a:t>
+              <a:t>–path=C:\mysocnet –</a:t>
+            </a:r>
+            <a:r>
+              <a:rPr lang="en-US" b="1" i="1" dirty="0" smtClean="0">
+                <a:solidFill>
+                  <a:srgbClr val="FF0000"/>
+                </a:solidFill>
+              </a:rPr>
+              <a:t>account=your@gmail.com,kunci1234,facebook </a:t>
             </a:r>
             <a:r>
               <a:rPr lang="en-US" b="1" i="1" dirty="0" smtClean="0">
@@ -16364,8 +16372,13 @@
                   <a:srgbClr val="FF0000"/>
                 </a:solidFill>
               </a:rPr>
-              <a:t>account=gumuruh@gmail,kunci1234,facebook</a:t>
-            </a:r>
+              <a:t>account=your@gmail.com,kunci1234,facebook</a:t>
+            </a:r>
+            <a:endParaRPr lang="en-US" b="1" i="1" dirty="0" smtClean="0">
+              <a:solidFill>
+                <a:srgbClr val="FF0000"/>
+              </a:solidFill>
+            </a:endParaRPr>
           </a:p>
           <a:p>
             <a:pPr marL="768096" lvl="2" indent="0">
@@ -16998,7 +17011,7 @@
             </a:pPr>
             <a:r>
               <a:rPr lang="en-US" b="1" dirty="0" smtClean="0"/>
-              <a:t>*.norm</a:t>
+              <a:t>*.post</a:t>
             </a:r>
           </a:p>
           <a:p>
@@ -19914,12 +19927,16 @@
           <a:p>
             <a:pPr lvl="1"/>
             <a:r>
-              <a:rPr lang="en-US" sz="2400" b="1" dirty="0"/>
-              <a:t>*.norm </a:t>
+              <a:rPr lang="en-US" sz="2400" b="1" dirty="0" smtClean="0"/>
+              <a:t>*.post </a:t>
+            </a:r>
+            <a:r>
+              <a:rPr lang="en-US" sz="2400" dirty="0" smtClean="0"/>
+              <a:t>: </a:t>
             </a:r>
             <a:r>
               <a:rPr lang="en-US" sz="2400" dirty="0"/>
-              <a:t>: status </a:t>
+              <a:t>status </a:t>
             </a:r>
             <a:r>
               <a:rPr lang="en-US" sz="2400" dirty="0" err="1"/>
@@ -21093,7 +21110,7 @@
                   </a:outerShdw>
                 </a:effectLst>
               </a:rPr>
-              <a:t>.norm</a:t>
+              <a:t>.post</a:t>
             </a:r>
             <a:endParaRPr lang="en-US" sz="2400" b="1" dirty="0">
               <a:ln w="17780" cmpd="sng">

</xml_diff>